<commit_message>
corrected typos in poster
</commit_message>
<xml_diff>
--- a/resources/presentations/Fossa_Micel_RP_Poster.pptx
+++ b/resources/presentations/Fossa_Micel_RP_Poster.pptx
@@ -181,12 +181,12 @@
   <pc:docChgLst>
     <pc:chgData name="Giuliana Miceli" userId="5f1c9d0e36796aec" providerId="LiveId" clId="{32DCAD44-71EF-4236-940E-80FFCD1C60D1}"/>
     <pc:docChg chg="undo custSel modSld">
-      <pc:chgData name="Giuliana Miceli" userId="5f1c9d0e36796aec" providerId="LiveId" clId="{32DCAD44-71EF-4236-940E-80FFCD1C60D1}" dt="2019-11-17T12:56:43.464" v="6934" actId="20577"/>
+      <pc:chgData name="Giuliana Miceli" userId="5f1c9d0e36796aec" providerId="LiveId" clId="{32DCAD44-71EF-4236-940E-80FFCD1C60D1}" dt="2019-11-19T15:24:36.434" v="6965" actId="20577"/>
       <pc:docMkLst>
         <pc:docMk/>
       </pc:docMkLst>
       <pc:sldChg chg="addSp delSp modSp">
-        <pc:chgData name="Giuliana Miceli" userId="5f1c9d0e36796aec" providerId="LiveId" clId="{32DCAD44-71EF-4236-940E-80FFCD1C60D1}" dt="2019-11-17T12:56:43.464" v="6934" actId="20577"/>
+        <pc:chgData name="Giuliana Miceli" userId="5f1c9d0e36796aec" providerId="LiveId" clId="{32DCAD44-71EF-4236-940E-80FFCD1C60D1}" dt="2019-11-19T15:24:36.434" v="6965" actId="20577"/>
         <pc:sldMkLst>
           <pc:docMk/>
           <pc:sldMk cId="0" sldId="258"/>
@@ -216,7 +216,7 @@
           </ac:spMkLst>
         </pc:spChg>
         <pc:spChg chg="add mod ord">
-          <ac:chgData name="Giuliana Miceli" userId="5f1c9d0e36796aec" providerId="LiveId" clId="{32DCAD44-71EF-4236-940E-80FFCD1C60D1}" dt="2019-11-17T11:18:53.519" v="6100" actId="20577"/>
+          <ac:chgData name="Giuliana Miceli" userId="5f1c9d0e36796aec" providerId="LiveId" clId="{32DCAD44-71EF-4236-940E-80FFCD1C60D1}" dt="2019-11-19T15:11:21.405" v="6946" actId="2"/>
           <ac:spMkLst>
             <pc:docMk/>
             <pc:sldMk cId="0" sldId="258"/>
@@ -272,7 +272,7 @@
           </ac:spMkLst>
         </pc:spChg>
         <pc:spChg chg="add mod">
-          <ac:chgData name="Giuliana Miceli" userId="5f1c9d0e36796aec" providerId="LiveId" clId="{32DCAD44-71EF-4236-940E-80FFCD1C60D1}" dt="2019-11-17T12:56:43.464" v="6934" actId="20577"/>
+          <ac:chgData name="Giuliana Miceli" userId="5f1c9d0e36796aec" providerId="LiveId" clId="{32DCAD44-71EF-4236-940E-80FFCD1C60D1}" dt="2019-11-19T15:24:36.434" v="6965" actId="20577"/>
           <ac:spMkLst>
             <pc:docMk/>
             <pc:sldMk cId="0" sldId="258"/>
@@ -280,7 +280,7 @@
           </ac:spMkLst>
         </pc:spChg>
         <pc:spChg chg="mod topLvl">
-          <ac:chgData name="Giuliana Miceli" userId="5f1c9d0e36796aec" providerId="LiveId" clId="{32DCAD44-71EF-4236-940E-80FFCD1C60D1}" dt="2019-11-17T12:40:47.052" v="6770" actId="20577"/>
+          <ac:chgData name="Giuliana Miceli" userId="5f1c9d0e36796aec" providerId="LiveId" clId="{32DCAD44-71EF-4236-940E-80FFCD1C60D1}" dt="2019-11-19T15:11:26.553" v="6951" actId="2"/>
           <ac:spMkLst>
             <pc:docMk/>
             <pc:sldMk cId="0" sldId="258"/>
@@ -352,7 +352,7 @@
           </ac:spMkLst>
         </pc:spChg>
         <pc:spChg chg="mod">
-          <ac:chgData name="Giuliana Miceli" userId="5f1c9d0e36796aec" providerId="LiveId" clId="{32DCAD44-71EF-4236-940E-80FFCD1C60D1}" dt="2019-11-17T12:47:48.552" v="6802" actId="20577"/>
+          <ac:chgData name="Giuliana Miceli" userId="5f1c9d0e36796aec" providerId="LiveId" clId="{32DCAD44-71EF-4236-940E-80FFCD1C60D1}" dt="2019-11-19T15:11:18.545" v="6944" actId="2"/>
           <ac:spMkLst>
             <pc:docMk/>
             <pc:sldMk cId="0" sldId="258"/>
@@ -360,7 +360,7 @@
           </ac:spMkLst>
         </pc:spChg>
         <pc:spChg chg="mod">
-          <ac:chgData name="Giuliana Miceli" userId="5f1c9d0e36796aec" providerId="LiveId" clId="{32DCAD44-71EF-4236-940E-80FFCD1C60D1}" dt="2019-11-17T11:48:57.468" v="6581" actId="179"/>
+          <ac:chgData name="Giuliana Miceli" userId="5f1c9d0e36796aec" providerId="LiveId" clId="{32DCAD44-71EF-4236-940E-80FFCD1C60D1}" dt="2019-11-19T15:11:12.159" v="6940" actId="2"/>
           <ac:spMkLst>
             <pc:docMk/>
             <pc:sldMk cId="0" sldId="258"/>
@@ -384,7 +384,7 @@
           </ac:grpSpMkLst>
         </pc:grpChg>
         <pc:graphicFrameChg chg="add mod modGraphic">
-          <ac:chgData name="Giuliana Miceli" userId="5f1c9d0e36796aec" providerId="LiveId" clId="{32DCAD44-71EF-4236-940E-80FFCD1C60D1}" dt="2019-11-17T12:50:04.199" v="6836" actId="20577"/>
+          <ac:chgData name="Giuliana Miceli" userId="5f1c9d0e36796aec" providerId="LiveId" clId="{32DCAD44-71EF-4236-940E-80FFCD1C60D1}" dt="2019-11-19T15:11:31.514" v="6955" actId="2"/>
           <ac:graphicFrameMkLst>
             <pc:docMk/>
             <pc:sldMk cId="0" sldId="258"/>
@@ -416,7 +416,7 @@
           </ac:graphicFrameMkLst>
         </pc:graphicFrameChg>
         <pc:graphicFrameChg chg="add mod modGraphic">
-          <ac:chgData name="Giuliana Miceli" userId="5f1c9d0e36796aec" providerId="LiveId" clId="{32DCAD44-71EF-4236-940E-80FFCD1C60D1}" dt="2019-11-17T12:54:08.117" v="6929" actId="1036"/>
+          <ac:chgData name="Giuliana Miceli" userId="5f1c9d0e36796aec" providerId="LiveId" clId="{32DCAD44-71EF-4236-940E-80FFCD1C60D1}" dt="2019-11-19T15:11:33.381" v="6957" actId="2"/>
           <ac:graphicFrameMkLst>
             <pc:docMk/>
             <pc:sldMk cId="0" sldId="258"/>
@@ -702,7 +702,7 @@
             </a:lvl1pPr>
           </a:lstStyle>
           <a:p>
-            <a:endParaRPr lang="en-US"/>
+            <a:endParaRPr lang="en-US" dirty="0"/>
           </a:p>
         </p:txBody>
       </p:sp>
@@ -737,7 +737,7 @@
               <a:rPr lang="en-US" smtClean="0"/>
               <a:t>11/19/2019</a:t>
             </a:fld>
-            <a:endParaRPr lang="en-US"/>
+            <a:endParaRPr lang="en-US" dirty="0"/>
           </a:p>
         </p:txBody>
       </p:sp>
@@ -770,7 +770,7 @@
           <a:bodyPr vert="horz" lIns="91440" tIns="45720" rIns="91440" bIns="45720" rtlCol="0" anchor="ctr"/>
           <a:lstStyle/>
           <a:p>
-            <a:endParaRPr lang="en-US"/>
+            <a:endParaRPr lang="en-US" dirty="0"/>
           </a:p>
         </p:txBody>
       </p:sp>
@@ -861,7 +861,7 @@
             </a:lvl1pPr>
           </a:lstStyle>
           <a:p>
-            <a:endParaRPr lang="en-US"/>
+            <a:endParaRPr lang="en-US" dirty="0"/>
           </a:p>
         </p:txBody>
       </p:sp>
@@ -896,7 +896,7 @@
               <a:rPr lang="en-US" smtClean="0"/>
               <a:t>‹N›</a:t>
             </a:fld>
-            <a:endParaRPr lang="en-US"/>
+            <a:endParaRPr lang="en-US" dirty="0"/>
           </a:p>
         </p:txBody>
       </p:sp>
@@ -1070,7 +1070,7 @@
               <a:rPr lang="en-US" smtClean="0"/>
               <a:t>1</a:t>
             </a:fld>
-            <a:endParaRPr lang="en-US"/>
+            <a:endParaRPr lang="en-US" dirty="0"/>
           </a:p>
         </p:txBody>
       </p:sp>
@@ -4482,7 +4482,7 @@
           <a:lstStyle/>
           <a:p>
             <a:pPr algn="ctr"/>
-            <a:endParaRPr lang="fr-FR" sz="4145"/>
+            <a:endParaRPr lang="fr-FR" sz="4145" dirty="0"/>
           </a:p>
         </p:txBody>
       </p:sp>
@@ -4579,7 +4579,7 @@
           <a:lstStyle/>
           <a:p>
             <a:pPr algn="ctr"/>
-            <a:endParaRPr lang="fr-FR" sz="4145"/>
+            <a:endParaRPr lang="fr-FR" sz="4145" dirty="0"/>
           </a:p>
         </p:txBody>
       </p:sp>
@@ -4927,37 +4927,7 @@
                 <a:latin typeface="Georgia" panose="02040502050405020303"/>
                 <a:ea typeface="Georgia" panose="02040502050405020303"/>
               </a:rPr>
-              <a:t>Optimal control of Trajectory of reusable launcher in </a:t>
-            </a:r>
-            <a:r>
-              <a:rPr lang="en-US" sz="5000" b="1" spc="-1" dirty="0" err="1">
-                <a:solidFill>
-                  <a:schemeClr val="bg1"/>
-                </a:solidFill>
-                <a:latin typeface="Georgia" panose="02040502050405020303"/>
-                <a:ea typeface="Georgia" panose="02040502050405020303"/>
-              </a:rPr>
-              <a:t>OpenMDAO</a:t>
-            </a:r>
-            <a:r>
-              <a:rPr lang="en-US" sz="5000" b="1" spc="-1" dirty="0">
-                <a:solidFill>
-                  <a:schemeClr val="bg1"/>
-                </a:solidFill>
-                <a:latin typeface="Georgia" panose="02040502050405020303"/>
-                <a:ea typeface="Georgia" panose="02040502050405020303"/>
-              </a:rPr>
-              <a:t>/</a:t>
-            </a:r>
-            <a:r>
-              <a:rPr lang="en-US" sz="5000" b="1" spc="-1" dirty="0" err="1">
-                <a:solidFill>
-                  <a:schemeClr val="bg1"/>
-                </a:solidFill>
-                <a:latin typeface="Georgia" panose="02040502050405020303"/>
-                <a:ea typeface="Georgia" panose="02040502050405020303"/>
-              </a:rPr>
-              <a:t>dymos</a:t>
+              <a:t>Optimal control of Trajectory of reusable launcher in OpenMDAO/dymos</a:t>
             </a:r>
             <a:endParaRPr lang="en-US" sz="5000" spc="-1" dirty="0">
               <a:solidFill>
@@ -5082,25 +5052,7 @@
                 </a:solidFill>
                 <a:latin typeface="+mj-lt"/>
               </a:rPr>
-              <a:t>ISAE-SUPAERO, </a:t>
-            </a:r>
-            <a:r>
-              <a:rPr lang="en-US" sz="2200" dirty="0" err="1">
-                <a:solidFill>
-                  <a:schemeClr val="bg1"/>
-                </a:solidFill>
-                <a:latin typeface="+mj-lt"/>
-              </a:rPr>
-              <a:t>Université</a:t>
-            </a:r>
-            <a:r>
-              <a:rPr lang="en-US" sz="2200" dirty="0">
-                <a:solidFill>
-                  <a:schemeClr val="bg1"/>
-                </a:solidFill>
-                <a:latin typeface="+mj-lt"/>
-              </a:rPr>
-              <a:t> de Toulouse, France</a:t>
+              <a:t>ISAE-SUPAERO, Université de Toulouse, France</a:t>
             </a:r>
             <a:endParaRPr lang="pt-BR" sz="2200" dirty="0">
               <a:solidFill>
@@ -5183,31 +5135,7 @@
               <a:rPr lang="en-IN" sz="1400" dirty="0">
                 <a:latin typeface="+mj-lt"/>
               </a:rPr>
-              <a:t> J. S. </a:t>
-            </a:r>
-            <a:r>
-              <a:rPr lang="en-IN" sz="1400" dirty="0" err="1">
-                <a:latin typeface="+mj-lt"/>
-              </a:rPr>
-              <a:t>Gray</a:t>
-            </a:r>
-            <a:r>
-              <a:rPr lang="en-IN" sz="1400" dirty="0">
-                <a:latin typeface="+mj-lt"/>
-              </a:rPr>
-              <a:t>, et al. “</a:t>
-            </a:r>
-            <a:r>
-              <a:rPr lang="en-IN" sz="1400" dirty="0" err="1">
-                <a:latin typeface="+mj-lt"/>
-              </a:rPr>
-              <a:t>OpenMDAO</a:t>
-            </a:r>
-            <a:r>
-              <a:rPr lang="en-IN" sz="1400" dirty="0">
-                <a:latin typeface="+mj-lt"/>
-              </a:rPr>
-              <a:t>:  an  open-source framework for multidisciplinary design, analysis,  and optimization”,  2019.</a:t>
+              <a:t> J. S. Gray, et al. “OpenMDAO:  an  open-source framework for multidisciplinary design, analysis,  and optimization”,  2019.</a:t>
             </a:r>
           </a:p>
           <a:p>
@@ -5228,16 +5156,10 @@
               <a:t>ӓ</a:t>
             </a:r>
             <a:r>
-              <a:rPr lang="en-IN" sz="1400" dirty="0" err="1">
-                <a:latin typeface="+mj-lt"/>
-              </a:rPr>
-              <a:t>chter</a:t>
-            </a:r>
-            <a:r>
               <a:rPr lang="en-IN" sz="1400" dirty="0">
                 <a:latin typeface="+mj-lt"/>
               </a:rPr>
-              <a:t> et al. “On  the  implementation of an interior-point filter line-search algorithm for large-scale nonlinear programming”, 2006.  </a:t>
+              <a:t>chter et al. “On  the  implementation of an interior-point filter line-search algorithm for large-scale nonlinear programming”, 2006.  </a:t>
             </a:r>
           </a:p>
           <a:p>
@@ -5273,19 +5195,7 @@
               <a:rPr lang="en-US" sz="1400" dirty="0">
                 <a:latin typeface="+mj-lt"/>
               </a:rPr>
-              <a:t> Mohamed Amine </a:t>
-            </a:r>
-            <a:r>
-              <a:rPr lang="en-US" sz="1400" dirty="0" err="1">
-                <a:latin typeface="+mj-lt"/>
-              </a:rPr>
-              <a:t>Bouhlel</a:t>
-            </a:r>
-            <a:r>
-              <a:rPr lang="en-US" sz="1400" dirty="0">
-                <a:latin typeface="+mj-lt"/>
-              </a:rPr>
-              <a:t> et al. “A Python surrogate modeling framework with derivatives”, 2019.</a:t>
+              <a:t> Mohamed Amine Bouhlel et al. “A Python surrogate modeling framework with derivatives”, 2019.</a:t>
             </a:r>
             <a:endParaRPr lang="en-US" sz="1600" dirty="0">
               <a:latin typeface="+mj-lt"/>
@@ -5719,31 +5629,7 @@
                 <a:rPr lang="en-US" sz="2400" dirty="0">
                   <a:latin typeface="Georgia Pro" panose="02040502050405020303" pitchFamily="18" charset="0"/>
                 </a:rPr>
-                <a:t>The principal tools used to achieve the final goal are </a:t>
-              </a:r>
-              <a:r>
-                <a:rPr lang="en-US" sz="2400" dirty="0" err="1">
-                  <a:latin typeface="Georgia Pro" panose="02040502050405020303" pitchFamily="18" charset="0"/>
-                </a:rPr>
-                <a:t>OpenMDAO</a:t>
-              </a:r>
-              <a:r>
-                <a:rPr lang="en-US" sz="2400" dirty="0">
-                  <a:latin typeface="Georgia Pro" panose="02040502050405020303" pitchFamily="18" charset="0"/>
-                </a:rPr>
-                <a:t> and </a:t>
-              </a:r>
-              <a:r>
-                <a:rPr lang="en-US" sz="2400" dirty="0" err="1">
-                  <a:latin typeface="Georgia Pro" panose="02040502050405020303" pitchFamily="18" charset="0"/>
-                </a:rPr>
-                <a:t>Dymos</a:t>
-              </a:r>
-              <a:r>
-                <a:rPr lang="en-US" sz="2400" dirty="0">
-                  <a:latin typeface="Georgia Pro" panose="02040502050405020303" pitchFamily="18" charset="0"/>
-                </a:rPr>
-                <a:t>, two Python libraries that provide a user-friendly and powerful interface for solving optimal control problems through different numerical techniques. </a:t>
+                <a:t>The principal tools used to achieve the final goal are OpenMDAO and Dymos, two Python libraries that provide a user-friendly and powerful interface for solving optimal control problems through different numerical techniques. </a:t>
               </a:r>
             </a:p>
           </p:txBody>
@@ -5952,67 +5838,7 @@
                   <a:rPr lang="en-US" sz="2400" dirty="0">
                     <a:latin typeface="Georgia Pro" panose="02040502050405020303" pitchFamily="18" charset="0"/>
                   </a:rPr>
-                  <a:t>The optimal control problem is solved through a direct method. It is transcribed into a Nonlinear Programming problem (NLP) and solved with an iterative routine. The states and controls are discretized in time and then approximated with an interpolating polynomial to fit the discrete data. High-Order Gauss-</a:t>
-                </a:r>
-                <a:r>
-                  <a:rPr lang="en-US" sz="2400" dirty="0" err="1">
-                    <a:latin typeface="Georgia Pro" panose="02040502050405020303" pitchFamily="18" charset="0"/>
-                  </a:rPr>
-                  <a:t>Lobatto</a:t>
-                </a:r>
-                <a:r>
-                  <a:rPr lang="en-US" sz="2400" dirty="0">
-                    <a:latin typeface="Georgia Pro" panose="02040502050405020303" pitchFamily="18" charset="0"/>
-                  </a:rPr>
-                  <a:t> and </a:t>
-                </a:r>
-                <a:r>
-                  <a:rPr lang="en-US" sz="2400" dirty="0" err="1">
-                    <a:latin typeface="Georgia Pro" panose="02040502050405020303" pitchFamily="18" charset="0"/>
-                  </a:rPr>
-                  <a:t>Radau</a:t>
-                </a:r>
-                <a:r>
-                  <a:rPr lang="en-US" sz="2400" dirty="0">
-                    <a:latin typeface="Georgia Pro" panose="02040502050405020303" pitchFamily="18" charset="0"/>
-                  </a:rPr>
-                  <a:t> </a:t>
-                </a:r>
-                <a:r>
-                  <a:rPr lang="en-US" sz="2400" dirty="0" err="1">
-                    <a:latin typeface="Georgia Pro" panose="02040502050405020303" pitchFamily="18" charset="0"/>
-                  </a:rPr>
-                  <a:t>Pseudospectral</a:t>
-                </a:r>
-                <a:r>
-                  <a:rPr lang="en-US" sz="2400" dirty="0">
-                    <a:latin typeface="Georgia Pro" panose="02040502050405020303" pitchFamily="18" charset="0"/>
-                  </a:rPr>
-                  <a:t> are the transcription methods mostly used and thus implemented in different libraries. The open-source, Python-based </a:t>
-                </a:r>
-                <a:r>
-                  <a:rPr lang="en-US" sz="2400" dirty="0" err="1">
-                    <a:latin typeface="Georgia Pro" panose="02040502050405020303" pitchFamily="18" charset="0"/>
-                  </a:rPr>
-                  <a:t>Dymos</a:t>
-                </a:r>
-                <a:r>
-                  <a:rPr lang="en-US" sz="2400" dirty="0">
-                    <a:latin typeface="Georgia Pro" panose="02040502050405020303" pitchFamily="18" charset="0"/>
-                  </a:rPr>
-                  <a:t> library [1] takes advantage of the </a:t>
-                </a:r>
-                <a:r>
-                  <a:rPr lang="en-US" sz="2400" dirty="0" err="1">
-                    <a:latin typeface="Georgia Pro" panose="02040502050405020303" pitchFamily="18" charset="0"/>
-                  </a:rPr>
-                  <a:t>OpenMDAO</a:t>
-                </a:r>
-                <a:r>
-                  <a:rPr lang="en-US" sz="2400" dirty="0">
-                    <a:latin typeface="Georgia Pro" panose="02040502050405020303" pitchFamily="18" charset="0"/>
-                  </a:rPr>
-                  <a:t> [2] framework to perform such a transcription and solves the resulting NLP problem wrapping an external gradient-based solver such as IPOPT [3-4] or SNOPT [5].  Throughout this work the optimal transfer trajectories are obtained as solutions of a continuous-time optimal control problem arisen from the equations of motion (EOMs) that describe the spacecraft dynamics under the restricted two-body problem assumption. A transcription method is then applied to convert the optimal control problem into the corresponding NLP problem which is then numerically solved with an appropriate iterative algorithm. Since the main goal is to find the most fuel-efficient ascent trajectory the resulting objective function is given by:</a:t>
+                  <a:t>The optimal control problem is solved through a direct method. It is transcribed into a Nonlinear Programming problem (NLP) and solved with an iterative routine. The states and controls are discretized in time and then approximated with an interpolating polynomial to fit the discrete data. High-Order Gauss-Lobatto and Radau Pseudospectral are the transcription methods mostly used and thus implemented in different libraries. The open-source, Python-based Dymos library [1] takes advantage of the OpenMDAO [2] framework to perform such a transcription and solves the resulting NLP problem wrapping an external gradient-based solver such as IPOPT [3-4] or SNOPT [5].  Throughout this work the optimal transfer trajectories are obtained as solutions of a continuous-time optimal control problem arisen from the equations of motion (EOMs) that describe the spacecraft dynamics under the restricted two-body problem assumption. A transcription method is then applied to convert the optimal control problem into the corresponding NLP problem which is then numerically solved with an appropriate iterative algorithm. Since the main goal is to find the most fuel-efficient ascent trajectory the resulting objective function is given by:</a:t>
                 </a:r>
               </a:p>
               <a:p>
@@ -6226,7 +6052,7 @@
           <a:graphicData uri="http://schemas.openxmlformats.org/presentationml/2006/ole">
             <mc:AlternateContent xmlns:mc="http://schemas.openxmlformats.org/markup-compatibility/2006">
               <mc:Choice xmlns:v="urn:schemas-microsoft-com:vml" Requires="v">
-                <p:oleObj spid="_x0000_s1029" name="Acrobat Document" r:id="rId8" imgW="0" imgH="0" progId="AcroExch.Document.DC">
+                <p:oleObj spid="_x0000_s1026" name="Acrobat Document" r:id="rId8" imgW="0" imgH="0" progId="AcroExch.Document.DC">
                   <p:embed/>
                 </p:oleObj>
               </mc:Choice>
@@ -6814,31 +6640,19 @@
               <a:rPr lang="en-US" sz="2400" dirty="0">
                 <a:latin typeface="Georgia Pro" panose="02040502050405020303" pitchFamily="18" charset="0"/>
               </a:rPr>
-              <a:t>The project is placed in the context of a future reusable launcher design, all the disciplines involved will be dynamically optimized with a multidisciplinary optimization method. In order to speed up the iterative process related to the overall optimization, the results coming from the trajectory block are given using a surrogate model such as one implemented in the SMT [6] python library. It consists in a grid containing all the possible results obtainable by the trajectory, considering all the intervals value of ISP and </a:t>
-            </a:r>
-            <a:r>
-              <a:rPr lang="en-US" sz="2400" dirty="0" err="1">
+              <a:t>The project is placed in the context of a future reusable launcher design, all the disciplines involved will be dynamically optimized with a multidisciplinary optimization method. In order to speed up the iterative process related to the overall optimization, the results coming from the trajectory block are given using a surrogate model such as the one implemented in the SMT [6] python library. It consists in a grid containing all the possible results obtainable by the trajectory, considering all </a:t>
+            </a:r>
+            <a:r>
+              <a:rPr lang="en-US" sz="2400">
                 <a:latin typeface="Georgia Pro" panose="02040502050405020303" pitchFamily="18" charset="0"/>
               </a:rPr>
-              <a:t>twr</a:t>
+              <a:t>the interval values </a:t>
             </a:r>
             <a:r>
               <a:rPr lang="en-US" sz="2400" dirty="0">
                 <a:latin typeface="Georgia Pro" panose="02040502050405020303" pitchFamily="18" charset="0"/>
               </a:rPr>
-              <a:t>. A limited number of solution are computed taking couples of ISP-</a:t>
-            </a:r>
-            <a:r>
-              <a:rPr lang="en-US" sz="2400" dirty="0" err="1">
-                <a:latin typeface="Georgia Pro" panose="02040502050405020303" pitchFamily="18" charset="0"/>
-              </a:rPr>
-              <a:t>twr</a:t>
-            </a:r>
-            <a:r>
-              <a:rPr lang="en-US" sz="2400" dirty="0">
-                <a:latin typeface="Georgia Pro" panose="02040502050405020303" pitchFamily="18" charset="0"/>
-              </a:rPr>
-              <a:t> values with a Latin Hypercube Distribution, then the remaining cases are found interpolating the point previously obtained. </a:t>
+              <a:t>of ISP and twr. A limited number of solutions are computed taking couples of ISP-twr values with a Latin Hypercube Distribution, then the remaining cases are found interpolating the point previously obtained. </a:t>
             </a:r>
             <a:endParaRPr lang="en-US" sz="2800" dirty="0"/>
           </a:p>
@@ -6859,7 +6673,7 @@
           <p:nvPr>
             <p:extLst>
               <p:ext uri="{D42A27DB-BD31-4B8C-83A1-F6EECF244321}">
-                <p14:modId xmlns:p14="http://schemas.microsoft.com/office/powerpoint/2010/main" val="2681935241"/>
+                <p14:modId xmlns:p14="http://schemas.microsoft.com/office/powerpoint/2010/main" val="3198994490"/>
               </p:ext>
             </p:extLst>
           </p:nvPr>
@@ -6980,14 +6794,11 @@
                     <a:p>
                       <a:pPr algn="ctr"/>
                       <a:r>
-                        <a:rPr lang="en-US" sz="2000" dirty="0" err="1">
+                        <a:rPr lang="en-US" sz="2000" dirty="0">
                           <a:latin typeface="Georgia Pro" panose="02040502050405020303" pitchFamily="18" charset="0"/>
                         </a:rPr>
                         <a:t>Isp</a:t>
                       </a:r>
-                      <a:endParaRPr lang="en-US" sz="2000" dirty="0">
-                        <a:latin typeface="Georgia Pro" panose="02040502050405020303" pitchFamily="18" charset="0"/>
-                      </a:endParaRPr>
                     </a:p>
                   </a:txBody>
                   <a:tcPr/>
@@ -7054,14 +6865,11 @@
                     <a:p>
                       <a:pPr algn="ctr"/>
                       <a:r>
-                        <a:rPr lang="en-US" sz="2000" dirty="0" err="1">
+                        <a:rPr lang="en-US" sz="2000" dirty="0">
                           <a:latin typeface="Georgia Pro" panose="02040502050405020303" pitchFamily="18" charset="0"/>
                         </a:rPr>
                         <a:t>twr</a:t>
                       </a:r>
-                      <a:endParaRPr lang="en-US" sz="2000" dirty="0">
-                        <a:latin typeface="Georgia Pro" panose="02040502050405020303" pitchFamily="18" charset="0"/>
-                      </a:endParaRPr>
                     </a:p>
                   </a:txBody>
                   <a:tcPr/>
@@ -7392,7 +7200,7 @@
           <p:nvPr>
             <p:extLst>
               <p:ext uri="{D42A27DB-BD31-4B8C-83A1-F6EECF244321}">
-                <p14:modId xmlns:p14="http://schemas.microsoft.com/office/powerpoint/2010/main" val="1097263864"/>
+                <p14:modId xmlns:p14="http://schemas.microsoft.com/office/powerpoint/2010/main" val="594310122"/>
               </p:ext>
             </p:extLst>
           </p:nvPr>
@@ -7493,13 +7301,13 @@
                     <a:p>
                       <a:pPr algn="ctr"/>
                       <a:r>
-                        <a:rPr lang="en-US" sz="2000" dirty="0" err="1">
+                        <a:rPr lang="en-US" sz="2000" dirty="0">
                           <a:latin typeface="Georgia Pro" panose="02040502050405020303" pitchFamily="18" charset="0"/>
                         </a:rPr>
                         <a:t>Periapsis</a:t>
                       </a:r>
                       <a:r>
-                        <a:rPr lang="en-US" sz="2000" baseline="-25000" dirty="0" err="1">
+                        <a:rPr lang="en-US" sz="2000" baseline="-25000" dirty="0">
                           <a:latin typeface="Georgia Pro" panose="02040502050405020303" pitchFamily="18" charset="0"/>
                         </a:rPr>
                         <a:t>HEO</a:t>
@@ -7557,20 +7365,17 @@
                     <a:p>
                       <a:pPr algn="ctr"/>
                       <a:r>
-                        <a:rPr lang="en-US" sz="2000" baseline="0" dirty="0" err="1">
+                        <a:rPr lang="en-US" sz="2000" baseline="0" dirty="0">
                           <a:latin typeface="Georgia Pro" panose="02040502050405020303" pitchFamily="18" charset="0"/>
                         </a:rPr>
                         <a:t>Apoapsis</a:t>
                       </a:r>
                       <a:r>
-                        <a:rPr lang="en-US" sz="2000" baseline="-25000" dirty="0" err="1">
+                        <a:rPr lang="en-US" sz="2000" baseline="-25000" dirty="0">
                           <a:latin typeface="Georgia Pro" panose="02040502050405020303" pitchFamily="18" charset="0"/>
                         </a:rPr>
                         <a:t>HEO</a:t>
                       </a:r>
-                      <a:endParaRPr lang="en-US" sz="2000" baseline="-25000" dirty="0">
-                        <a:latin typeface="Georgia Pro" panose="02040502050405020303" pitchFamily="18" charset="0"/>
-                      </a:endParaRPr>
                     </a:p>
                   </a:txBody>
                   <a:tcPr/>

</xml_diff>